<commit_message>
o done with lecture content
</commit_message>
<xml_diff>
--- a/Student Lecture/Demore_TCN_Lecture.pptx
+++ b/Student Lecture/Demore_TCN_Lecture.pptx
@@ -5,20 +5,21 @@
     <p:sldMasterId id="2147483648" r:id="rId1"/>
   </p:sldMasterIdLst>
   <p:notesMasterIdLst>
-    <p:notesMasterId r:id="rId13"/>
+    <p:notesMasterId r:id="rId14"/>
   </p:notesMasterIdLst>
   <p:sldIdLst>
     <p:sldId id="256" r:id="rId2"/>
     <p:sldId id="257" r:id="rId3"/>
     <p:sldId id="258" r:id="rId4"/>
     <p:sldId id="260" r:id="rId5"/>
-    <p:sldId id="262" r:id="rId6"/>
-    <p:sldId id="261" r:id="rId7"/>
-    <p:sldId id="268" r:id="rId8"/>
-    <p:sldId id="264" r:id="rId9"/>
-    <p:sldId id="265" r:id="rId10"/>
-    <p:sldId id="266" r:id="rId11"/>
-    <p:sldId id="267" r:id="rId12"/>
+    <p:sldId id="269" r:id="rId6"/>
+    <p:sldId id="262" r:id="rId7"/>
+    <p:sldId id="261" r:id="rId8"/>
+    <p:sldId id="268" r:id="rId9"/>
+    <p:sldId id="264" r:id="rId10"/>
+    <p:sldId id="265" r:id="rId11"/>
+    <p:sldId id="266" r:id="rId12"/>
+    <p:sldId id="267" r:id="rId13"/>
   </p:sldIdLst>
   <p:sldSz cx="12192000" cy="6858000"/>
   <p:notesSz cx="6858000" cy="9144000"/>
@@ -219,7 +220,7 @@
           <a:p>
             <a:fld id="{2B162E96-F7E4-4F72-B193-8E6291BA96EB}" type="datetimeFigureOut">
               <a:rPr lang="en-US" smtClean="0"/>
-              <a:t>8/14/2020</a:t>
+              <a:t>8/15/2020</a:t>
             </a:fld>
             <a:endParaRPr lang="en-US"/>
           </a:p>
@@ -1051,7 +1052,7 @@
           <a:p>
             <a:fld id="{AB8D34D5-F463-4000-9075-ABAEA5C4102B}" type="datetimeFigureOut">
               <a:rPr lang="en-US" smtClean="0"/>
-              <a:t>8/14/2020</a:t>
+              <a:t>8/15/2020</a:t>
             </a:fld>
             <a:endParaRPr lang="en-US"/>
           </a:p>
@@ -1643,7 +1644,7 @@
             <a:fld id="{AB8D34D5-F463-4000-9075-ABAEA5C4102B}" type="datetimeFigureOut">
               <a:rPr lang="en-US" smtClean="0"/>
               <a:pPr/>
-              <a:t>8/14/2020</a:t>
+              <a:t>8/15/2020</a:t>
             </a:fld>
             <a:endParaRPr lang="en-US"/>
           </a:p>
@@ -1858,7 +1859,7 @@
           <a:p>
             <a:fld id="{AB8D34D5-F463-4000-9075-ABAEA5C4102B}" type="datetimeFigureOut">
               <a:rPr lang="en-US" smtClean="0"/>
-              <a:t>8/14/2020</a:t>
+              <a:t>8/15/2020</a:t>
             </a:fld>
             <a:endParaRPr lang="en-US"/>
           </a:p>
@@ -2140,7 +2141,7 @@
           <a:p>
             <a:fld id="{AB8D34D5-F463-4000-9075-ABAEA5C4102B}" type="datetimeFigureOut">
               <a:rPr lang="en-US" smtClean="0"/>
-              <a:t>8/14/2020</a:t>
+              <a:t>8/15/2020</a:t>
             </a:fld>
             <a:endParaRPr lang="en-US"/>
           </a:p>
@@ -2405,7 +2406,7 @@
           <a:p>
             <a:fld id="{AB8D34D5-F463-4000-9075-ABAEA5C4102B}" type="datetimeFigureOut">
               <a:rPr lang="en-US" smtClean="0"/>
-              <a:t>8/14/2020</a:t>
+              <a:t>8/15/2020</a:t>
             </a:fld>
             <a:endParaRPr lang="en-US"/>
           </a:p>
@@ -2817,7 +2818,7 @@
           <a:p>
             <a:fld id="{AB8D34D5-F463-4000-9075-ABAEA5C4102B}" type="datetimeFigureOut">
               <a:rPr lang="en-US" smtClean="0"/>
-              <a:t>8/14/2020</a:t>
+              <a:t>8/15/2020</a:t>
             </a:fld>
             <a:endParaRPr lang="en-US"/>
           </a:p>
@@ -2963,7 +2964,7 @@
           <a:p>
             <a:fld id="{AB8D34D5-F463-4000-9075-ABAEA5C4102B}" type="datetimeFigureOut">
               <a:rPr lang="en-US" smtClean="0"/>
-              <a:t>8/14/2020</a:t>
+              <a:t>8/15/2020</a:t>
             </a:fld>
             <a:endParaRPr lang="en-US"/>
           </a:p>
@@ -3616,7 +3617,7 @@
           <a:p>
             <a:fld id="{AB8D34D5-F463-4000-9075-ABAEA5C4102B}" type="datetimeFigureOut">
               <a:rPr lang="en-US" smtClean="0"/>
-              <a:t>8/14/2020</a:t>
+              <a:t>8/15/2020</a:t>
             </a:fld>
             <a:endParaRPr lang="en-US"/>
           </a:p>
@@ -4149,6 +4150,130 @@
           <p:cNvPr id="2" name="Title 1">
             <a:extLst>
               <a:ext uri="{FF2B5EF4-FFF2-40B4-BE49-F238E27FC236}">
+                <a16:creationId xmlns:a16="http://schemas.microsoft.com/office/drawing/2014/main" id="{2A90F66B-6262-4E21-A611-FCB35D23C1A6}"/>
+              </a:ext>
+            </a:extLst>
+          </p:cNvPr>
+          <p:cNvSpPr>
+            <a:spLocks noGrp="1"/>
+          </p:cNvSpPr>
+          <p:nvPr>
+            <p:ph type="title"/>
+          </p:nvPr>
+        </p:nvSpPr>
+        <p:spPr/>
+        <p:txBody>
+          <a:bodyPr/>
+          <a:lstStyle/>
+          <a:p>
+            <a:r>
+              <a:rPr lang="en-US" dirty="0"/>
+              <a:t>Implementation</a:t>
+            </a:r>
+          </a:p>
+        </p:txBody>
+      </p:sp>
+      <p:sp>
+        <p:nvSpPr>
+          <p:cNvPr id="3" name="Content Placeholder 2">
+            <a:extLst>
+              <a:ext uri="{FF2B5EF4-FFF2-40B4-BE49-F238E27FC236}">
+                <a16:creationId xmlns:a16="http://schemas.microsoft.com/office/drawing/2014/main" id="{118A64C0-30FD-4131-9817-6D914AAB4A80}"/>
+              </a:ext>
+            </a:extLst>
+          </p:cNvPr>
+          <p:cNvSpPr>
+            <a:spLocks noGrp="1"/>
+          </p:cNvSpPr>
+          <p:nvPr>
+            <p:ph idx="1"/>
+          </p:nvPr>
+        </p:nvSpPr>
+        <p:spPr/>
+        <p:txBody>
+          <a:bodyPr/>
+          <a:lstStyle/>
+          <a:p>
+            <a:r>
+              <a:rPr lang="en-US" dirty="0"/>
+              <a:t>See </a:t>
+            </a:r>
+            <a:r>
+              <a:rPr lang="en-US" dirty="0" err="1"/>
+              <a:t>jupyter</a:t>
+            </a:r>
+            <a:r>
+              <a:rPr lang="en-US" dirty="0"/>
+              <a:t> notebook</a:t>
+            </a:r>
+          </a:p>
+        </p:txBody>
+      </p:sp>
+      <p:pic>
+        <p:nvPicPr>
+          <p:cNvPr id="5" name="Picture 4">
+            <a:extLst>
+              <a:ext uri="{FF2B5EF4-FFF2-40B4-BE49-F238E27FC236}">
+                <a16:creationId xmlns:a16="http://schemas.microsoft.com/office/drawing/2014/main" id="{160EF10C-4EB4-4E11-81C1-9FE74B11EA75}"/>
+              </a:ext>
+            </a:extLst>
+          </p:cNvPr>
+          <p:cNvPicPr>
+            <a:picLocks noChangeAspect="1"/>
+          </p:cNvPicPr>
+          <p:nvPr/>
+        </p:nvPicPr>
+        <p:blipFill>
+          <a:blip r:embed="rId2"/>
+          <a:stretch>
+            <a:fillRect/>
+          </a:stretch>
+        </p:blipFill>
+        <p:spPr>
+          <a:xfrm>
+            <a:off x="7741900" y="2543969"/>
+            <a:ext cx="3381375" cy="2914650"/>
+          </a:xfrm>
+          <a:prstGeom prst="rect">
+            <a:avLst/>
+          </a:prstGeom>
+        </p:spPr>
+      </p:pic>
+    </p:spTree>
+    <p:extLst>
+      <p:ext uri="{BB962C8B-B14F-4D97-AF65-F5344CB8AC3E}">
+        <p14:creationId xmlns:p14="http://schemas.microsoft.com/office/powerpoint/2010/main" val="742991953"/>
+      </p:ext>
+    </p:extLst>
+  </p:cSld>
+  <p:clrMapOvr>
+    <a:masterClrMapping/>
+  </p:clrMapOvr>
+</p:sld>
+</file>
+
+<file path=ppt/slides/slide11.xml><?xml version="1.0" encoding="utf-8"?>
+<p:sld xmlns:a="http://schemas.openxmlformats.org/drawingml/2006/main" xmlns:r="http://schemas.openxmlformats.org/officeDocument/2006/relationships" xmlns:p="http://schemas.openxmlformats.org/presentationml/2006/main">
+  <p:cSld>
+    <p:spTree>
+      <p:nvGrpSpPr>
+        <p:cNvPr id="1" name=""/>
+        <p:cNvGrpSpPr/>
+        <p:nvPr/>
+      </p:nvGrpSpPr>
+      <p:grpSpPr>
+        <a:xfrm>
+          <a:off x="0" y="0"/>
+          <a:ext cx="0" cy="0"/>
+          <a:chOff x="0" y="0"/>
+          <a:chExt cx="0" cy="0"/>
+        </a:xfrm>
+      </p:grpSpPr>
+      <p:sp>
+        <p:nvSpPr>
+          <p:cNvPr id="2" name="Title 1">
+            <a:extLst>
+              <a:ext uri="{FF2B5EF4-FFF2-40B4-BE49-F238E27FC236}">
                 <a16:creationId xmlns:a16="http://schemas.microsoft.com/office/drawing/2014/main" id="{1F234BAA-5299-4FD4-A626-C0A1B3D49FB5}"/>
               </a:ext>
             </a:extLst>
@@ -4190,7 +4315,9 @@
         </p:nvSpPr>
         <p:spPr/>
         <p:txBody>
-          <a:bodyPr/>
+          <a:bodyPr>
+            <a:normAutofit lnSpcReduction="10000"/>
+          </a:bodyPr>
           <a:lstStyle/>
           <a:p>
             <a:pPr marL="0" indent="0">
@@ -4400,6 +4527,53 @@
               </a:rPr>
               <a:t>, Medium, 4 Feb. 2019, medium.com/@raushan2807/temporal-convolutional-networks-bfea16e6d7d2.</a:t>
             </a:r>
+          </a:p>
+          <a:p>
+            <a:pPr marL="0" indent="0">
+              <a:buNone/>
+            </a:pPr>
+            <a:r>
+              <a:rPr lang="en-US" dirty="0"/>
+              <a:t>[4] </a:t>
+            </a:r>
+            <a:r>
+              <a:rPr lang="en-US" dirty="0">
+                <a:effectLst/>
+              </a:rPr>
+              <a:t>Chollet </a:t>
+            </a:r>
+            <a:r>
+              <a:rPr lang="en-US" dirty="0" err="1">
+                <a:effectLst/>
+              </a:rPr>
+              <a:t>François</a:t>
+            </a:r>
+            <a:r>
+              <a:rPr lang="en-US" dirty="0">
+                <a:effectLst/>
+              </a:rPr>
+              <a:t>. </a:t>
+            </a:r>
+            <a:r>
+              <a:rPr lang="en-US" i="1" dirty="0">
+                <a:effectLst/>
+              </a:rPr>
+              <a:t>Deep Learning with Python</a:t>
+            </a:r>
+            <a:r>
+              <a:rPr lang="en-US" dirty="0">
+                <a:effectLst/>
+              </a:rPr>
+              <a:t>. Manning Publications Co., 2018.</a:t>
+            </a:r>
+          </a:p>
+          <a:p>
+            <a:pPr marL="0" indent="0">
+              <a:buNone/>
+            </a:pPr>
+            <a:endParaRPr lang="en-US" dirty="0">
+              <a:effectLst/>
+            </a:endParaRPr>
           </a:p>
           <a:p>
             <a:pPr marL="0" indent="0">
@@ -4422,7 +4596,7 @@
 </p:sld>
 </file>
 
-<file path=ppt/slides/slide11.xml><?xml version="1.0" encoding="utf-8"?>
+<file path=ppt/slides/slide12.xml><?xml version="1.0" encoding="utf-8"?>
 <p:sld xmlns:a="http://schemas.openxmlformats.org/drawingml/2006/main" xmlns:r="http://schemas.openxmlformats.org/officeDocument/2006/relationships" xmlns:p="http://schemas.openxmlformats.org/presentationml/2006/main">
   <p:cSld>
     <p:spTree>
@@ -4727,11 +4901,52 @@
             </a:pPr>
             <a:r>
               <a:rPr lang="en-US" sz="3200" dirty="0"/>
-              <a:t>Causality</a:t>
-            </a:r>
-          </a:p>
-        </p:txBody>
-      </p:sp>
+              <a:t>Recurrent Neural Networks</a:t>
+            </a:r>
+          </a:p>
+          <a:p>
+            <a:pPr>
+              <a:lnSpc>
+                <a:spcPct val="150000"/>
+              </a:lnSpc>
+            </a:pPr>
+            <a:r>
+              <a:rPr lang="en-US" sz="3200" dirty="0"/>
+              <a:t>LSTM</a:t>
+            </a:r>
+          </a:p>
+        </p:txBody>
+      </p:sp>
+      <p:pic>
+        <p:nvPicPr>
+          <p:cNvPr id="5" name="Picture 4">
+            <a:extLst>
+              <a:ext uri="{FF2B5EF4-FFF2-40B4-BE49-F238E27FC236}">
+                <a16:creationId xmlns:a16="http://schemas.microsoft.com/office/drawing/2014/main" id="{7B2B4FC4-C0F6-4D7D-BC7A-331C24956464}"/>
+              </a:ext>
+            </a:extLst>
+          </p:cNvPr>
+          <p:cNvPicPr>
+            <a:picLocks noChangeAspect="1"/>
+          </p:cNvPicPr>
+          <p:nvPr/>
+        </p:nvPicPr>
+        <p:blipFill>
+          <a:blip r:embed="rId2"/>
+          <a:stretch>
+            <a:fillRect/>
+          </a:stretch>
+        </p:blipFill>
+        <p:spPr>
+          <a:xfrm>
+            <a:off x="8845381" y="2169876"/>
+            <a:ext cx="2574892" cy="3089870"/>
+          </a:xfrm>
+          <a:prstGeom prst="rect">
+            <a:avLst/>
+          </a:prstGeom>
+        </p:spPr>
+      </p:pic>
     </p:spTree>
     <p:extLst>
       <p:ext uri="{BB962C8B-B14F-4D97-AF65-F5344CB8AC3E}">
@@ -4831,11 +5046,18 @@
             </a:pPr>
             <a:r>
               <a:rPr lang="en-US" sz="3200" dirty="0"/>
-              <a:t>Computer Vision vs Time </a:t>
-            </a:r>
-            <a:r>
-              <a:rPr lang="en-US" sz="3200"/>
-              <a:t>Series Data</a:t>
+              <a:t>Computer Vision</a:t>
+            </a:r>
+          </a:p>
+          <a:p>
+            <a:pPr>
+              <a:lnSpc>
+                <a:spcPct val="150000"/>
+              </a:lnSpc>
+            </a:pPr>
+            <a:r>
+              <a:rPr lang="en-US" sz="3200" dirty="0"/>
+              <a:t>Time Series Data</a:t>
             </a:r>
           </a:p>
           <a:p>
@@ -4881,6 +5103,36 @@
           <a:xfrm>
             <a:off x="7421186" y="1825625"/>
             <a:ext cx="4457700" cy="1400175"/>
+          </a:xfrm>
+          <a:prstGeom prst="rect">
+            <a:avLst/>
+          </a:prstGeom>
+        </p:spPr>
+      </p:pic>
+      <p:pic>
+        <p:nvPicPr>
+          <p:cNvPr id="6" name="Picture 5">
+            <a:extLst>
+              <a:ext uri="{FF2B5EF4-FFF2-40B4-BE49-F238E27FC236}">
+                <a16:creationId xmlns:a16="http://schemas.microsoft.com/office/drawing/2014/main" id="{D514BFCD-B520-479C-AD3E-7B61A9A28478}"/>
+              </a:ext>
+            </a:extLst>
+          </p:cNvPr>
+          <p:cNvPicPr>
+            <a:picLocks noChangeAspect="1"/>
+          </p:cNvPicPr>
+          <p:nvPr/>
+        </p:nvPicPr>
+        <p:blipFill>
+          <a:blip r:embed="rId4"/>
+          <a:stretch>
+            <a:fillRect/>
+          </a:stretch>
+        </p:blipFill>
+        <p:spPr>
+          <a:xfrm>
+            <a:off x="8517767" y="3429000"/>
+            <a:ext cx="2619375" cy="504825"/>
           </a:xfrm>
           <a:prstGeom prst="rect">
             <a:avLst/>
@@ -4922,7 +5174,7 @@
           <p:cNvPr id="2" name="Title 1">
             <a:extLst>
               <a:ext uri="{FF2B5EF4-FFF2-40B4-BE49-F238E27FC236}">
-                <a16:creationId xmlns:a16="http://schemas.microsoft.com/office/drawing/2014/main" id="{3FCC306B-7C9C-4E4A-9A84-FD61F5FA6A0D}"/>
+                <a16:creationId xmlns:a16="http://schemas.microsoft.com/office/drawing/2014/main" id="{0764217B-4066-47C3-B41A-C1CBD559E059}"/>
               </a:ext>
             </a:extLst>
           </p:cNvPr>
@@ -4940,7 +5192,7 @@
           <a:p>
             <a:r>
               <a:rPr lang="en-US" dirty="0"/>
-              <a:t>Dilation</a:t>
+              <a:t>Causality</a:t>
             </a:r>
           </a:p>
         </p:txBody>
@@ -4950,7 +5202,7 @@
           <p:cNvPr id="3" name="Content Placeholder 2">
             <a:extLst>
               <a:ext uri="{FF2B5EF4-FFF2-40B4-BE49-F238E27FC236}">
-                <a16:creationId xmlns:a16="http://schemas.microsoft.com/office/drawing/2014/main" id="{68E0C81B-C728-4E4E-BA33-87984A0B6FAF}"/>
+                <a16:creationId xmlns:a16="http://schemas.microsoft.com/office/drawing/2014/main" id="{87D4CE10-1168-4C66-BE32-8BDE72645A1C}"/>
               </a:ext>
             </a:extLst>
           </p:cNvPr>
@@ -4963,7 +5215,9 @@
         </p:nvSpPr>
         <p:spPr/>
         <p:txBody>
-          <a:bodyPr/>
+          <a:bodyPr>
+            <a:normAutofit/>
+          </a:bodyPr>
           <a:lstStyle/>
           <a:p>
             <a:pPr>
@@ -4973,31 +5227,40 @@
             </a:pPr>
             <a:r>
               <a:rPr lang="en-US" sz="3200" dirty="0"/>
-              <a:t>Allow for a larger receptive field</a:t>
-            </a:r>
-          </a:p>
-          <a:p>
-            <a:pPr lvl="1">
+              <a:t>Input length = output length</a:t>
+            </a:r>
+          </a:p>
+          <a:p>
+            <a:pPr>
               <a:lnSpc>
                 <a:spcPct val="150000"/>
               </a:lnSpc>
             </a:pPr>
             <a:r>
               <a:rPr lang="en-US" sz="3200" dirty="0"/>
-              <a:t>Exponential vs linear growth with each layer</a:t>
-            </a:r>
-          </a:p>
-          <a:p>
-            <a:endParaRPr lang="en-US" dirty="0"/>
+              <a:t>No information leakage</a:t>
+            </a:r>
+          </a:p>
+          <a:p>
+            <a:pPr>
+              <a:lnSpc>
+                <a:spcPct val="150000"/>
+              </a:lnSpc>
+            </a:pPr>
+            <a:r>
+              <a:rPr lang="en-US" sz="3200" b="0" i="0" u="none" strike="noStrike" baseline="0" dirty="0"/>
+              <a:t>TCN = 1D FCN + causal convolutions</a:t>
+            </a:r>
+            <a:endParaRPr lang="en-US" sz="3200" dirty="0"/>
           </a:p>
         </p:txBody>
       </p:sp>
       <p:pic>
         <p:nvPicPr>
-          <p:cNvPr id="6" name="Picture 5">
-            <a:extLst>
-              <a:ext uri="{FF2B5EF4-FFF2-40B4-BE49-F238E27FC236}">
-                <a16:creationId xmlns:a16="http://schemas.microsoft.com/office/drawing/2014/main" id="{17706321-D272-4C99-88B1-A14B19BBD9E3}"/>
+          <p:cNvPr id="4" name="Picture 3">
+            <a:extLst>
+              <a:ext uri="{FF2B5EF4-FFF2-40B4-BE49-F238E27FC236}">
+                <a16:creationId xmlns:a16="http://schemas.microsoft.com/office/drawing/2014/main" id="{44CADF02-3AB9-4E22-A2B6-9325A732AC4E}"/>
               </a:ext>
             </a:extLst>
           </p:cNvPr>
@@ -5006,150 +5269,15 @@
           </p:cNvPicPr>
           <p:nvPr/>
         </p:nvPicPr>
-        <p:blipFill>
+        <p:blipFill rotWithShape="1">
           <a:blip r:embed="rId2"/>
-          <a:stretch>
-            <a:fillRect/>
-          </a:stretch>
+          <a:srcRect l="70051" b="34628"/>
+          <a:stretch/>
         </p:blipFill>
         <p:spPr>
           <a:xfrm>
-            <a:off x="743355" y="4864540"/>
-            <a:ext cx="4343400" cy="1257300"/>
-          </a:xfrm>
-          <a:prstGeom prst="rect">
-            <a:avLst/>
-          </a:prstGeom>
-        </p:spPr>
-      </p:pic>
-      <p:sp>
-        <p:nvSpPr>
-          <p:cNvPr id="7" name="TextBox 6">
-            <a:extLst>
-              <a:ext uri="{FF2B5EF4-FFF2-40B4-BE49-F238E27FC236}">
-                <a16:creationId xmlns:a16="http://schemas.microsoft.com/office/drawing/2014/main" id="{65E6014F-F3D5-4B1A-B287-E8AC5851D291}"/>
-              </a:ext>
-            </a:extLst>
-          </p:cNvPr>
-          <p:cNvSpPr txBox="1"/>
-          <p:nvPr/>
-        </p:nvSpPr>
-        <p:spPr>
-          <a:xfrm>
-            <a:off x="706446" y="4181382"/>
-            <a:ext cx="5504155" cy="923330"/>
-          </a:xfrm>
-          <a:prstGeom prst="rect">
-            <a:avLst/>
-          </a:prstGeom>
-          <a:noFill/>
-        </p:spPr>
-        <p:txBody>
-          <a:bodyPr wrap="square" rtlCol="0">
-            <a:spAutoFit/>
-          </a:bodyPr>
-          <a:lstStyle/>
-          <a:p>
-            <a:r>
-              <a:rPr lang="en-US" b="0" i="0" dirty="0">
-                <a:solidFill>
-                  <a:srgbClr val="292929"/>
-                </a:solidFill>
-                <a:effectLst/>
-                <a:latin typeface="medium-content-serif-font"/>
-              </a:rPr>
-              <a:t>For a 1-D sequence input x ∈ </a:t>
-            </a:r>
-            <a:r>
-              <a:rPr lang="en-US" b="1" i="0" dirty="0" err="1">
-                <a:solidFill>
-                  <a:srgbClr val="292929"/>
-                </a:solidFill>
-                <a:effectLst/>
-                <a:latin typeface="medium-content-serif-font"/>
-              </a:rPr>
-              <a:t>R</a:t>
-            </a:r>
-            <a:r>
-              <a:rPr lang="en-US" b="0" i="0" dirty="0" err="1">
-                <a:solidFill>
-                  <a:srgbClr val="292929"/>
-                </a:solidFill>
-                <a:effectLst/>
-                <a:latin typeface="medium-content-serif-font"/>
-              </a:rPr>
-              <a:t>^n</a:t>
-            </a:r>
-            <a:r>
-              <a:rPr lang="en-US" b="0" i="0" dirty="0">
-                <a:solidFill>
-                  <a:srgbClr val="292929"/>
-                </a:solidFill>
-                <a:effectLst/>
-                <a:latin typeface="medium-content-serif-font"/>
-              </a:rPr>
-              <a:t> and a filter </a:t>
-            </a:r>
-          </a:p>
-          <a:p>
-            <a:r>
-              <a:rPr lang="en-US" b="0" i="0" dirty="0">
-                <a:solidFill>
-                  <a:srgbClr val="292929"/>
-                </a:solidFill>
-                <a:effectLst/>
-                <a:latin typeface="medium-content-serif-font"/>
-              </a:rPr>
-              <a:t>f: {0,…,k-1} → </a:t>
-            </a:r>
-            <a:r>
-              <a:rPr lang="en-US" b="1" i="0" dirty="0">
-                <a:solidFill>
-                  <a:srgbClr val="292929"/>
-                </a:solidFill>
-                <a:effectLst/>
-                <a:latin typeface="medium-content-serif-font"/>
-              </a:rPr>
-              <a:t>R</a:t>
-            </a:r>
-            <a:r>
-              <a:rPr lang="en-US" b="0" i="0" dirty="0">
-                <a:solidFill>
-                  <a:srgbClr val="292929"/>
-                </a:solidFill>
-                <a:effectLst/>
-                <a:latin typeface="medium-content-serif-font"/>
-              </a:rPr>
-              <a:t>, the dilated convolution operation F on element s of the sequence is defined as:</a:t>
-            </a:r>
-            <a:endParaRPr lang="en-US" dirty="0"/>
-          </a:p>
-        </p:txBody>
-      </p:sp>
-      <p:pic>
-        <p:nvPicPr>
-          <p:cNvPr id="8" name="Picture 7">
-            <a:extLst>
-              <a:ext uri="{FF2B5EF4-FFF2-40B4-BE49-F238E27FC236}">
-                <a16:creationId xmlns:a16="http://schemas.microsoft.com/office/drawing/2014/main" id="{62AF5DA8-0B2E-4906-931D-C3C98CD050CE}"/>
-              </a:ext>
-            </a:extLst>
-          </p:cNvPr>
-          <p:cNvPicPr>
-            <a:picLocks noChangeAspect="1"/>
-          </p:cNvPicPr>
-          <p:nvPr/>
-        </p:nvPicPr>
-        <p:blipFill>
-          <a:blip r:embed="rId3"/>
-          <a:stretch>
-            <a:fillRect/>
-          </a:stretch>
-        </p:blipFill>
-        <p:spPr>
-          <a:xfrm>
-            <a:off x="7650698" y="3795283"/>
-            <a:ext cx="4228188" cy="2453788"/>
+            <a:off x="8790725" y="2329572"/>
+            <a:ext cx="2852636" cy="2378615"/>
           </a:xfrm>
           <a:prstGeom prst="rect">
             <a:avLst/>
@@ -5159,7 +5287,7 @@
     </p:spTree>
     <p:extLst>
       <p:ext uri="{BB962C8B-B14F-4D97-AF65-F5344CB8AC3E}">
-        <p14:creationId xmlns:p14="http://schemas.microsoft.com/office/powerpoint/2010/main" val="4284469414"/>
+        <p14:creationId xmlns:p14="http://schemas.microsoft.com/office/powerpoint/2010/main" val="3892146148"/>
       </p:ext>
     </p:extLst>
   </p:cSld>
@@ -5191,7 +5319,7 @@
           <p:cNvPr id="2" name="Title 1">
             <a:extLst>
               <a:ext uri="{FF2B5EF4-FFF2-40B4-BE49-F238E27FC236}">
-                <a16:creationId xmlns:a16="http://schemas.microsoft.com/office/drawing/2014/main" id="{AA5072F2-8035-4D5F-AB1E-9956E9187E64}"/>
+                <a16:creationId xmlns:a16="http://schemas.microsoft.com/office/drawing/2014/main" id="{3FCC306B-7C9C-4E4A-9A84-FD61F5FA6A0D}"/>
               </a:ext>
             </a:extLst>
           </p:cNvPr>
@@ -5209,7 +5337,7 @@
           <a:p>
             <a:r>
               <a:rPr lang="en-US" dirty="0"/>
-              <a:t>Residuals</a:t>
+              <a:t>Dilation</a:t>
             </a:r>
           </a:p>
         </p:txBody>
@@ -5219,7 +5347,7 @@
           <p:cNvPr id="3" name="Content Placeholder 2">
             <a:extLst>
               <a:ext uri="{FF2B5EF4-FFF2-40B4-BE49-F238E27FC236}">
-                <a16:creationId xmlns:a16="http://schemas.microsoft.com/office/drawing/2014/main" id="{D2F81193-0835-4489-BEF1-04906C233DB4}"/>
+                <a16:creationId xmlns:a16="http://schemas.microsoft.com/office/drawing/2014/main" id="{68E0C81B-C728-4E4E-BA33-87984A0B6FAF}"/>
               </a:ext>
             </a:extLst>
           </p:cNvPr>
@@ -5232,9 +5360,7 @@
         </p:nvSpPr>
         <p:spPr/>
         <p:txBody>
-          <a:bodyPr>
-            <a:normAutofit/>
-          </a:bodyPr>
+          <a:bodyPr/>
           <a:lstStyle/>
           <a:p>
             <a:pPr>
@@ -5244,19 +5370,22 @@
             </a:pPr>
             <a:r>
               <a:rPr lang="en-US" sz="3200" dirty="0"/>
-              <a:t>Outputs added to inputs</a:t>
-            </a:r>
-          </a:p>
-          <a:p>
-            <a:pPr>
+              <a:t>Allow for a larger receptive field</a:t>
+            </a:r>
+          </a:p>
+          <a:p>
+            <a:pPr lvl="1">
               <a:lnSpc>
                 <a:spcPct val="150000"/>
               </a:lnSpc>
             </a:pPr>
             <a:r>
               <a:rPr lang="en-US" sz="3200" dirty="0"/>
-              <a:t>(Optional) Input passed through convolution</a:t>
-            </a:r>
+              <a:t>Exponential vs linear growth with each layer</a:t>
+            </a:r>
+          </a:p>
+          <a:p>
+            <a:endParaRPr lang="en-US" dirty="0"/>
           </a:p>
         </p:txBody>
       </p:sp>
@@ -5265,7 +5394,7 @@
           <p:cNvPr id="6" name="Picture 5">
             <a:extLst>
               <a:ext uri="{FF2B5EF4-FFF2-40B4-BE49-F238E27FC236}">
-                <a16:creationId xmlns:a16="http://schemas.microsoft.com/office/drawing/2014/main" id="{B36C9C49-8CA9-41B2-AAB4-1C3963EB2509}"/>
+                <a16:creationId xmlns:a16="http://schemas.microsoft.com/office/drawing/2014/main" id="{17706321-D272-4C99-88B1-A14B19BBD9E3}"/>
               </a:ext>
             </a:extLst>
           </p:cNvPr>
@@ -5282,18 +5411,194 @@
         </p:blipFill>
         <p:spPr>
           <a:xfrm>
-            <a:off x="8604886" y="2021325"/>
-            <a:ext cx="3038475" cy="4000096"/>
+            <a:off x="743355" y="4864540"/>
+            <a:ext cx="4343400" cy="1257300"/>
           </a:xfrm>
           <a:prstGeom prst="rect">
             <a:avLst/>
           </a:prstGeom>
         </p:spPr>
       </p:pic>
+      <p:sp>
+        <p:nvSpPr>
+          <p:cNvPr id="7" name="TextBox 6">
+            <a:extLst>
+              <a:ext uri="{FF2B5EF4-FFF2-40B4-BE49-F238E27FC236}">
+                <a16:creationId xmlns:a16="http://schemas.microsoft.com/office/drawing/2014/main" id="{65E6014F-F3D5-4B1A-B287-E8AC5851D291}"/>
+              </a:ext>
+            </a:extLst>
+          </p:cNvPr>
+          <p:cNvSpPr txBox="1"/>
+          <p:nvPr/>
+        </p:nvSpPr>
+        <p:spPr>
+          <a:xfrm>
+            <a:off x="706446" y="4181382"/>
+            <a:ext cx="5504155" cy="923330"/>
+          </a:xfrm>
+          <a:prstGeom prst="rect">
+            <a:avLst/>
+          </a:prstGeom>
+          <a:noFill/>
+        </p:spPr>
+        <p:txBody>
+          <a:bodyPr wrap="square" rtlCol="0">
+            <a:spAutoFit/>
+          </a:bodyPr>
+          <a:lstStyle/>
+          <a:p>
+            <a:r>
+              <a:rPr lang="en-US" b="0" i="0" dirty="0">
+                <a:solidFill>
+                  <a:srgbClr val="292929"/>
+                </a:solidFill>
+                <a:effectLst/>
+              </a:rPr>
+              <a:t>For a 1-D sequence input x ∈ </a:t>
+            </a:r>
+            <a:r>
+              <a:rPr lang="en-US" b="1" i="0" dirty="0" err="1">
+                <a:solidFill>
+                  <a:srgbClr val="292929"/>
+                </a:solidFill>
+                <a:effectLst/>
+              </a:rPr>
+              <a:t>R</a:t>
+            </a:r>
+            <a:r>
+              <a:rPr lang="en-US" b="0" i="0" dirty="0" err="1">
+                <a:solidFill>
+                  <a:srgbClr val="292929"/>
+                </a:solidFill>
+                <a:effectLst/>
+              </a:rPr>
+              <a:t>^n</a:t>
+            </a:r>
+            <a:r>
+              <a:rPr lang="en-US" b="0" i="0" dirty="0">
+                <a:solidFill>
+                  <a:srgbClr val="292929"/>
+                </a:solidFill>
+                <a:effectLst/>
+              </a:rPr>
+              <a:t> and a filter </a:t>
+            </a:r>
+          </a:p>
+          <a:p>
+            <a:r>
+              <a:rPr lang="en-US" b="0" i="0" dirty="0">
+                <a:solidFill>
+                  <a:srgbClr val="292929"/>
+                </a:solidFill>
+                <a:effectLst/>
+              </a:rPr>
+              <a:t>f: {0,…,k-1} → </a:t>
+            </a:r>
+            <a:r>
+              <a:rPr lang="en-US" b="1" i="0" dirty="0">
+                <a:solidFill>
+                  <a:srgbClr val="292929"/>
+                </a:solidFill>
+                <a:effectLst/>
+              </a:rPr>
+              <a:t>R</a:t>
+            </a:r>
+            <a:r>
+              <a:rPr lang="en-US" b="0" i="0" dirty="0">
+                <a:solidFill>
+                  <a:srgbClr val="292929"/>
+                </a:solidFill>
+                <a:effectLst/>
+              </a:rPr>
+              <a:t>, the dilated convolution operation F on element s of the sequence is defined as:</a:t>
+            </a:r>
+            <a:endParaRPr lang="en-US" dirty="0"/>
+          </a:p>
+        </p:txBody>
+      </p:sp>
+      <p:pic>
+        <p:nvPicPr>
+          <p:cNvPr id="8" name="Picture 7">
+            <a:extLst>
+              <a:ext uri="{FF2B5EF4-FFF2-40B4-BE49-F238E27FC236}">
+                <a16:creationId xmlns:a16="http://schemas.microsoft.com/office/drawing/2014/main" id="{62AF5DA8-0B2E-4906-931D-C3C98CD050CE}"/>
+              </a:ext>
+            </a:extLst>
+          </p:cNvPr>
+          <p:cNvPicPr>
+            <a:picLocks noChangeAspect="1"/>
+          </p:cNvPicPr>
+          <p:nvPr/>
+        </p:nvPicPr>
+        <p:blipFill>
+          <a:blip r:embed="rId3"/>
+          <a:stretch>
+            <a:fillRect/>
+          </a:stretch>
+        </p:blipFill>
+        <p:spPr>
+          <a:xfrm>
+            <a:off x="7650698" y="3795283"/>
+            <a:ext cx="4228188" cy="2453788"/>
+          </a:xfrm>
+          <a:prstGeom prst="rect">
+            <a:avLst/>
+          </a:prstGeom>
+        </p:spPr>
+      </p:pic>
+      <p:sp>
+        <p:nvSpPr>
+          <p:cNvPr id="4" name="TextBox 3">
+            <a:extLst>
+              <a:ext uri="{FF2B5EF4-FFF2-40B4-BE49-F238E27FC236}">
+                <a16:creationId xmlns:a16="http://schemas.microsoft.com/office/drawing/2014/main" id="{F9D04EFD-9878-47E7-B73D-34504A5E675A}"/>
+              </a:ext>
+            </a:extLst>
+          </p:cNvPr>
+          <p:cNvSpPr txBox="1"/>
+          <p:nvPr/>
+        </p:nvSpPr>
+        <p:spPr>
+          <a:xfrm>
+            <a:off x="743355" y="5787870"/>
+            <a:ext cx="4929476" cy="646331"/>
+          </a:xfrm>
+          <a:prstGeom prst="rect">
+            <a:avLst/>
+          </a:prstGeom>
+          <a:noFill/>
+        </p:spPr>
+        <p:txBody>
+          <a:bodyPr wrap="square" rtlCol="0">
+            <a:spAutoFit/>
+          </a:bodyPr>
+          <a:lstStyle/>
+          <a:p>
+            <a:pPr algn="l"/>
+            <a:r>
+              <a:rPr lang="en-US" sz="1800" b="0" i="0" u="none" strike="noStrike" baseline="0" dirty="0"/>
+              <a:t>where d is the dilation factor, k is the filter size, and s – d * </a:t>
+            </a:r>
+            <a:r>
+              <a:rPr lang="en-US" sz="1800" b="0" i="0" u="none" strike="noStrike" baseline="0" dirty="0" err="1"/>
+              <a:t>i</a:t>
+            </a:r>
+            <a:r>
+              <a:rPr lang="en-US" dirty="0"/>
+              <a:t> </a:t>
+            </a:r>
+            <a:r>
+              <a:rPr lang="en-US" sz="1800" b="0" i="0" u="none" strike="noStrike" baseline="0" dirty="0"/>
+              <a:t>accounts for the direction of the past</a:t>
+            </a:r>
+            <a:endParaRPr lang="en-US" dirty="0"/>
+          </a:p>
+        </p:txBody>
+      </p:sp>
     </p:spTree>
     <p:extLst>
       <p:ext uri="{BB962C8B-B14F-4D97-AF65-F5344CB8AC3E}">
-        <p14:creationId xmlns:p14="http://schemas.microsoft.com/office/powerpoint/2010/main" val="2510863299"/>
+        <p14:creationId xmlns:p14="http://schemas.microsoft.com/office/powerpoint/2010/main" val="4284469414"/>
       </p:ext>
     </p:extLst>
   </p:cSld>
@@ -5325,7 +5630,7 @@
           <p:cNvPr id="2" name="Title 1">
             <a:extLst>
               <a:ext uri="{FF2B5EF4-FFF2-40B4-BE49-F238E27FC236}">
-                <a16:creationId xmlns:a16="http://schemas.microsoft.com/office/drawing/2014/main" id="{28E65AE9-1614-4624-BA54-058A6AE4CBF2}"/>
+                <a16:creationId xmlns:a16="http://schemas.microsoft.com/office/drawing/2014/main" id="{AA5072F2-8035-4D5F-AB1E-9956E9187E64}"/>
               </a:ext>
             </a:extLst>
           </p:cNvPr>
@@ -5343,7 +5648,7 @@
           <a:p>
             <a:r>
               <a:rPr lang="en-US" dirty="0"/>
-              <a:t>Advantages</a:t>
+              <a:t>Residuals</a:t>
             </a:r>
           </a:p>
         </p:txBody>
@@ -5353,7 +5658,7 @@
           <p:cNvPr id="3" name="Content Placeholder 2">
             <a:extLst>
               <a:ext uri="{FF2B5EF4-FFF2-40B4-BE49-F238E27FC236}">
-                <a16:creationId xmlns:a16="http://schemas.microsoft.com/office/drawing/2014/main" id="{8EAD6691-DE5B-4663-A5C0-1D8B3B0EB726}"/>
+                <a16:creationId xmlns:a16="http://schemas.microsoft.com/office/drawing/2014/main" id="{D2F81193-0835-4489-BEF1-04906C233DB4}"/>
               </a:ext>
             </a:extLst>
           </p:cNvPr>
@@ -5378,7 +5683,7 @@
             </a:pPr>
             <a:r>
               <a:rPr lang="en-US" sz="3200" dirty="0"/>
-              <a:t>Parallelism</a:t>
+              <a:t>Outputs added to inputs</a:t>
             </a:r>
           </a:p>
           <a:p>
@@ -5387,10 +5692,7 @@
                 <a:spcPct val="150000"/>
               </a:lnSpc>
             </a:pPr>
-            <a:r>
-              <a:rPr lang="en-US" sz="3200" dirty="0"/>
-              <a:t>Flexible receptive field</a:t>
-            </a:r>
+            <a:endParaRPr lang="en-US" sz="3200" dirty="0"/>
           </a:p>
           <a:p>
             <a:pPr>
@@ -5400,7 +5702,7 @@
             </a:pPr>
             <a:r>
               <a:rPr lang="en-US" sz="3200" dirty="0"/>
-              <a:t>Low memory for training</a:t>
+              <a:t>Modifications rather than transformations</a:t>
             </a:r>
           </a:p>
           <a:p>
@@ -5411,18 +5713,75 @@
             </a:pPr>
             <a:r>
               <a:rPr lang="en-US" sz="3200" dirty="0"/>
-              <a:t>Locality</a:t>
-            </a:r>
-          </a:p>
-          <a:p>
-            <a:endParaRPr lang="en-US" sz="3200" dirty="0"/>
-          </a:p>
-        </p:txBody>
-      </p:sp>
+              <a:t>(Optional) Input passed through convolution</a:t>
+            </a:r>
+          </a:p>
+        </p:txBody>
+      </p:sp>
+      <p:pic>
+        <p:nvPicPr>
+          <p:cNvPr id="6" name="Picture 5">
+            <a:extLst>
+              <a:ext uri="{FF2B5EF4-FFF2-40B4-BE49-F238E27FC236}">
+                <a16:creationId xmlns:a16="http://schemas.microsoft.com/office/drawing/2014/main" id="{B36C9C49-8CA9-41B2-AAB4-1C3963EB2509}"/>
+              </a:ext>
+            </a:extLst>
+          </p:cNvPr>
+          <p:cNvPicPr>
+            <a:picLocks noChangeAspect="1"/>
+          </p:cNvPicPr>
+          <p:nvPr/>
+        </p:nvPicPr>
+        <p:blipFill>
+          <a:blip r:embed="rId2"/>
+          <a:stretch>
+            <a:fillRect/>
+          </a:stretch>
+        </p:blipFill>
+        <p:spPr>
+          <a:xfrm>
+            <a:off x="8604886" y="2021325"/>
+            <a:ext cx="3038475" cy="4000096"/>
+          </a:xfrm>
+          <a:prstGeom prst="rect">
+            <a:avLst/>
+          </a:prstGeom>
+        </p:spPr>
+      </p:pic>
+      <p:pic>
+        <p:nvPicPr>
+          <p:cNvPr id="5" name="Picture 4">
+            <a:extLst>
+              <a:ext uri="{FF2B5EF4-FFF2-40B4-BE49-F238E27FC236}">
+                <a16:creationId xmlns:a16="http://schemas.microsoft.com/office/drawing/2014/main" id="{8A94847B-A63B-461A-A592-C7DB5AE5427E}"/>
+              </a:ext>
+            </a:extLst>
+          </p:cNvPr>
+          <p:cNvPicPr>
+            <a:picLocks noChangeAspect="1"/>
+          </p:cNvPicPr>
+          <p:nvPr/>
+        </p:nvPicPr>
+        <p:blipFill>
+          <a:blip r:embed="rId3"/>
+          <a:stretch>
+            <a:fillRect/>
+          </a:stretch>
+        </p:blipFill>
+        <p:spPr>
+          <a:xfrm>
+            <a:off x="1105870" y="2784860"/>
+            <a:ext cx="2621242" cy="419978"/>
+          </a:xfrm>
+          <a:prstGeom prst="rect">
+            <a:avLst/>
+          </a:prstGeom>
+        </p:spPr>
+      </p:pic>
     </p:spTree>
     <p:extLst>
       <p:ext uri="{BB962C8B-B14F-4D97-AF65-F5344CB8AC3E}">
-        <p14:creationId xmlns:p14="http://schemas.microsoft.com/office/powerpoint/2010/main" val="3907872624"/>
+        <p14:creationId xmlns:p14="http://schemas.microsoft.com/office/powerpoint/2010/main" val="2510863299"/>
       </p:ext>
     </p:extLst>
   </p:cSld>
@@ -5454,7 +5813,7 @@
           <p:cNvPr id="2" name="Title 1">
             <a:extLst>
               <a:ext uri="{FF2B5EF4-FFF2-40B4-BE49-F238E27FC236}">
-                <a16:creationId xmlns:a16="http://schemas.microsoft.com/office/drawing/2014/main" id="{1396F6C0-CD68-446E-8BC0-B7A4EF7419F4}"/>
+                <a16:creationId xmlns:a16="http://schemas.microsoft.com/office/drawing/2014/main" id="{28E65AE9-1614-4624-BA54-058A6AE4CBF2}"/>
               </a:ext>
             </a:extLst>
           </p:cNvPr>
@@ -5472,7 +5831,7 @@
           <a:p>
             <a:r>
               <a:rPr lang="en-US" dirty="0"/>
-              <a:t>Disadvantages</a:t>
+              <a:t>Advantages</a:t>
             </a:r>
           </a:p>
         </p:txBody>
@@ -5482,7 +5841,7 @@
           <p:cNvPr id="3" name="Content Placeholder 2">
             <a:extLst>
               <a:ext uri="{FF2B5EF4-FFF2-40B4-BE49-F238E27FC236}">
-                <a16:creationId xmlns:a16="http://schemas.microsoft.com/office/drawing/2014/main" id="{E7A5B079-25A4-4617-BA03-9D16394809FC}"/>
+                <a16:creationId xmlns:a16="http://schemas.microsoft.com/office/drawing/2014/main" id="{8EAD6691-DE5B-4663-A5C0-1D8B3B0EB726}"/>
               </a:ext>
             </a:extLst>
           </p:cNvPr>
@@ -5507,7 +5866,7 @@
             </a:pPr>
             <a:r>
               <a:rPr lang="en-US" sz="3200" dirty="0"/>
-              <a:t>Parameterization</a:t>
+              <a:t>Parallelism</a:t>
             </a:r>
           </a:p>
           <a:p>
@@ -5518,7 +5877,7 @@
             </a:pPr>
             <a:r>
               <a:rPr lang="en-US" sz="3200" dirty="0"/>
-              <a:t>More storage than RNN</a:t>
+              <a:t>Flexible receptive field</a:t>
             </a:r>
           </a:p>
           <a:p>
@@ -5527,14 +5886,61 @@
                 <a:spcPct val="150000"/>
               </a:lnSpc>
             </a:pPr>
+            <a:r>
+              <a:rPr lang="en-US" sz="3200" dirty="0"/>
+              <a:t>Low memory for training</a:t>
+            </a:r>
+          </a:p>
+          <a:p>
+            <a:pPr>
+              <a:lnSpc>
+                <a:spcPct val="150000"/>
+              </a:lnSpc>
+            </a:pPr>
+            <a:r>
+              <a:rPr lang="en-US" sz="3200" dirty="0"/>
+              <a:t>Variable input length</a:t>
+            </a:r>
+          </a:p>
+          <a:p>
             <a:endParaRPr lang="en-US" sz="3200" dirty="0"/>
           </a:p>
         </p:txBody>
       </p:sp>
+      <p:pic>
+        <p:nvPicPr>
+          <p:cNvPr id="5" name="Picture 4">
+            <a:extLst>
+              <a:ext uri="{FF2B5EF4-FFF2-40B4-BE49-F238E27FC236}">
+                <a16:creationId xmlns:a16="http://schemas.microsoft.com/office/drawing/2014/main" id="{7487D30F-3321-474E-A5D9-65FAA08AAAD8}"/>
+              </a:ext>
+            </a:extLst>
+          </p:cNvPr>
+          <p:cNvPicPr>
+            <a:picLocks noChangeAspect="1"/>
+          </p:cNvPicPr>
+          <p:nvPr/>
+        </p:nvPicPr>
+        <p:blipFill>
+          <a:blip r:embed="rId2"/>
+          <a:stretch>
+            <a:fillRect/>
+          </a:stretch>
+        </p:blipFill>
+        <p:spPr>
+          <a:xfrm>
+            <a:off x="5956532" y="2462029"/>
+            <a:ext cx="5686829" cy="3078529"/>
+          </a:xfrm>
+          <a:prstGeom prst="rect">
+            <a:avLst/>
+          </a:prstGeom>
+        </p:spPr>
+      </p:pic>
     </p:spTree>
     <p:extLst>
       <p:ext uri="{BB962C8B-B14F-4D97-AF65-F5344CB8AC3E}">
-        <p14:creationId xmlns:p14="http://schemas.microsoft.com/office/powerpoint/2010/main" val="16224351"/>
+        <p14:creationId xmlns:p14="http://schemas.microsoft.com/office/powerpoint/2010/main" val="3907872624"/>
       </p:ext>
     </p:extLst>
   </p:cSld>
@@ -5566,7 +5972,7 @@
           <p:cNvPr id="2" name="Title 1">
             <a:extLst>
               <a:ext uri="{FF2B5EF4-FFF2-40B4-BE49-F238E27FC236}">
-                <a16:creationId xmlns:a16="http://schemas.microsoft.com/office/drawing/2014/main" id="{2A90F66B-6262-4E21-A611-FCB35D23C1A6}"/>
+                <a16:creationId xmlns:a16="http://schemas.microsoft.com/office/drawing/2014/main" id="{1396F6C0-CD68-446E-8BC0-B7A4EF7419F4}"/>
               </a:ext>
             </a:extLst>
           </p:cNvPr>
@@ -5584,7 +5990,7 @@
           <a:p>
             <a:r>
               <a:rPr lang="en-US" dirty="0"/>
-              <a:t>Implementation</a:t>
+              <a:t>Disadvantages</a:t>
             </a:r>
           </a:p>
         </p:txBody>
@@ -5594,7 +6000,7 @@
           <p:cNvPr id="3" name="Content Placeholder 2">
             <a:extLst>
               <a:ext uri="{FF2B5EF4-FFF2-40B4-BE49-F238E27FC236}">
-                <a16:creationId xmlns:a16="http://schemas.microsoft.com/office/drawing/2014/main" id="{118A64C0-30FD-4131-9817-6D914AAB4A80}"/>
+                <a16:creationId xmlns:a16="http://schemas.microsoft.com/office/drawing/2014/main" id="{E7A5B079-25A4-4617-BA03-9D16394809FC}"/>
               </a:ext>
             </a:extLst>
           </p:cNvPr>
@@ -5607,17 +6013,76 @@
         </p:nvSpPr>
         <p:spPr/>
         <p:txBody>
-          <a:bodyPr/>
-          <a:lstStyle/>
-          <a:p>
-            <a:endParaRPr lang="en-US" dirty="0"/>
-          </a:p>
-        </p:txBody>
-      </p:sp>
+          <a:bodyPr>
+            <a:normAutofit/>
+          </a:bodyPr>
+          <a:lstStyle/>
+          <a:p>
+            <a:pPr>
+              <a:lnSpc>
+                <a:spcPct val="150000"/>
+              </a:lnSpc>
+            </a:pPr>
+            <a:r>
+              <a:rPr lang="en-US" sz="3200" dirty="0"/>
+              <a:t>Parameterization</a:t>
+            </a:r>
+          </a:p>
+          <a:p>
+            <a:pPr>
+              <a:lnSpc>
+                <a:spcPct val="150000"/>
+              </a:lnSpc>
+            </a:pPr>
+            <a:r>
+              <a:rPr lang="en-US" sz="3200" dirty="0"/>
+              <a:t>More memory for testing</a:t>
+            </a:r>
+          </a:p>
+          <a:p>
+            <a:pPr>
+              <a:lnSpc>
+                <a:spcPct val="150000"/>
+              </a:lnSpc>
+            </a:pPr>
+            <a:endParaRPr lang="en-US" sz="3200" dirty="0"/>
+          </a:p>
+        </p:txBody>
+      </p:sp>
+      <p:pic>
+        <p:nvPicPr>
+          <p:cNvPr id="5" name="Picture 4">
+            <a:extLst>
+              <a:ext uri="{FF2B5EF4-FFF2-40B4-BE49-F238E27FC236}">
+                <a16:creationId xmlns:a16="http://schemas.microsoft.com/office/drawing/2014/main" id="{51A75101-CACC-46E2-80EC-002E306747B5}"/>
+              </a:ext>
+            </a:extLst>
+          </p:cNvPr>
+          <p:cNvPicPr>
+            <a:picLocks noChangeAspect="1"/>
+          </p:cNvPicPr>
+          <p:nvPr/>
+        </p:nvPicPr>
+        <p:blipFill>
+          <a:blip r:embed="rId2"/>
+          <a:stretch>
+            <a:fillRect/>
+          </a:stretch>
+        </p:blipFill>
+        <p:spPr>
+          <a:xfrm>
+            <a:off x="5595735" y="2124869"/>
+            <a:ext cx="6467475" cy="3752850"/>
+          </a:xfrm>
+          <a:prstGeom prst="rect">
+            <a:avLst/>
+          </a:prstGeom>
+        </p:spPr>
+      </p:pic>
     </p:spTree>
     <p:extLst>
       <p:ext uri="{BB962C8B-B14F-4D97-AF65-F5344CB8AC3E}">
-        <p14:creationId xmlns:p14="http://schemas.microsoft.com/office/powerpoint/2010/main" val="742991953"/>
+        <p14:creationId xmlns:p14="http://schemas.microsoft.com/office/powerpoint/2010/main" val="16224351"/>
       </p:ext>
     </p:extLst>
   </p:cSld>

</xml_diff>